<commit_message>
add full db design and define repository
</commit_message>
<xml_diff>
--- a/db_design/db-booking-ticket.pptx
+++ b/db_design/db-booking-ticket.pptx
@@ -1,14 +1,14 @@
 
 <file path=ppt/presentation.xml><?xml version="1.0" encoding="utf-8"?>
-<p:presentation xmlns:a="http://schemas.openxmlformats.org/drawingml/2006/main" xmlns:r="http://schemas.openxmlformats.org/officeDocument/2006/relationships" xmlns:p="http://schemas.openxmlformats.org/presentationml/2006/main" saveSubsetFonts="1">
+<p:presentation xmlns:a="http://schemas.openxmlformats.org/drawingml/2006/main" xmlns:r="http://schemas.openxmlformats.org/officeDocument/2006/relationships" xmlns:p="http://schemas.openxmlformats.org/presentationml/2006/main">
   <p:sldMasterIdLst>
     <p:sldMasterId id="2147483648" r:id="rId1"/>
   </p:sldMasterIdLst>
   <p:notesMasterIdLst>
-    <p:notesMasterId r:id="rId3"/>
+    <p:notesMasterId r:id="rId4"/>
   </p:notesMasterIdLst>
   <p:sldIdLst>
-    <p:sldId id="257" r:id="rId2"/>
+    <p:sldId id="257" r:id="rId3"/>
   </p:sldIdLst>
   <p:sldSz cx="9144000" cy="6858000" type="screen4x3"/>
   <p:notesSz cx="6858000" cy="9144000"/>
@@ -192,7 +192,6 @@
           <a:p>
             <a:fld id="{6EF903E0-6842-4702-A5D7-09E9C1E6FB80}" type="datetimeFigureOut">
               <a:rPr lang="en-US" smtClean="0"/>
-              <a:t>7/5/2019</a:t>
             </a:fld>
             <a:endParaRPr lang="en-US"/>
           </a:p>
@@ -259,6 +258,7 @@
               <a:rPr lang="en-US" smtClean="0"/>
               <a:t>Click to edit Master text styles</a:t>
             </a:r>
+            <a:endParaRPr lang="en-US" smtClean="0"/>
           </a:p>
           <a:p>
             <a:pPr lvl="1"/>
@@ -266,6 +266,7 @@
               <a:rPr lang="en-US" smtClean="0"/>
               <a:t>Second level</a:t>
             </a:r>
+            <a:endParaRPr lang="en-US" smtClean="0"/>
           </a:p>
           <a:p>
             <a:pPr lvl="2"/>
@@ -273,6 +274,7 @@
               <a:rPr lang="en-US" smtClean="0"/>
               <a:t>Third level</a:t>
             </a:r>
+            <a:endParaRPr lang="en-US" smtClean="0"/>
           </a:p>
           <a:p>
             <a:pPr lvl="3"/>
@@ -280,6 +282,7 @@
               <a:rPr lang="en-US" smtClean="0"/>
               <a:t>Fourth level</a:t>
             </a:r>
+            <a:endParaRPr lang="en-US" smtClean="0"/>
           </a:p>
           <a:p>
             <a:pPr lvl="4"/>
@@ -351,18 +354,12 @@
           <a:p>
             <a:fld id="{2C72F6EA-8EC7-43A8-8730-313E5681BA85}" type="slidenum">
               <a:rPr lang="en-US" smtClean="0"/>
-              <a:t>‹#›</a:t>
             </a:fld>
             <a:endParaRPr lang="en-US"/>
           </a:p>
         </p:txBody>
       </p:sp>
     </p:spTree>
-    <p:extLst>
-      <p:ext uri="{BB962C8B-B14F-4D97-AF65-F5344CB8AC3E}">
-        <p14:creationId xmlns:p14="http://schemas.microsoft.com/office/powerpoint/2010/main" val="3463667506"/>
-      </p:ext>
-    </p:extLst>
   </p:cSld>
   <p:clrMap bg1="lt1" tx1="dk1" bg2="lt2" tx2="dk2" accent1="accent1" accent2="accent2" accent3="accent3" accent4="accent4" accent5="accent5" accent6="accent6" hlink="hlink" folHlink="folHlink"/>
   <p:notesStyle>
@@ -525,18 +522,12 @@
           <a:p>
             <a:fld id="{2C72F6EA-8EC7-43A8-8730-313E5681BA85}" type="slidenum">
               <a:rPr lang="en-US" smtClean="0"/>
-              <a:t>1</a:t>
             </a:fld>
             <a:endParaRPr lang="en-US"/>
           </a:p>
         </p:txBody>
       </p:sp>
     </p:spTree>
-    <p:extLst>
-      <p:ext uri="{BB962C8B-B14F-4D97-AF65-F5344CB8AC3E}">
-        <p14:creationId xmlns:p14="http://schemas.microsoft.com/office/powerpoint/2010/main" val="2840175542"/>
-      </p:ext>
-    </p:extLst>
   </p:cSld>
   <p:clrMapOvr>
     <a:masterClrMapping/>
@@ -725,7 +716,6 @@
           <a:p>
             <a:fld id="{3B8B625B-F59E-409E-853D-5E09BE81799E}" type="datetimeFigureOut">
               <a:rPr lang="en-US" smtClean="0"/>
-              <a:t>7/5/2019</a:t>
             </a:fld>
             <a:endParaRPr lang="en-US"/>
           </a:p>
@@ -767,18 +757,12 @@
           <a:p>
             <a:fld id="{056E25EC-DDEA-4498-BD1F-8AD8CE522305}" type="slidenum">
               <a:rPr lang="en-US" smtClean="0"/>
-              <a:t>‹#›</a:t>
             </a:fld>
             <a:endParaRPr lang="en-US"/>
           </a:p>
         </p:txBody>
       </p:sp>
     </p:spTree>
-    <p:extLst>
-      <p:ext uri="{BB962C8B-B14F-4D97-AF65-F5344CB8AC3E}">
-        <p14:creationId xmlns:p14="http://schemas.microsoft.com/office/powerpoint/2010/main" val="462152561"/>
-      </p:ext>
-    </p:extLst>
   </p:cSld>
   <p:clrMapOvr>
     <a:masterClrMapping/>
@@ -846,6 +830,7 @@
               <a:rPr lang="en-US" smtClean="0"/>
               <a:t>Click to edit Master text styles</a:t>
             </a:r>
+            <a:endParaRPr lang="en-US" smtClean="0"/>
           </a:p>
           <a:p>
             <a:pPr lvl="1"/>
@@ -853,6 +838,7 @@
               <a:rPr lang="en-US" smtClean="0"/>
               <a:t>Second level</a:t>
             </a:r>
+            <a:endParaRPr lang="en-US" smtClean="0"/>
           </a:p>
           <a:p>
             <a:pPr lvl="2"/>
@@ -860,6 +846,7 @@
               <a:rPr lang="en-US" smtClean="0"/>
               <a:t>Third level</a:t>
             </a:r>
+            <a:endParaRPr lang="en-US" smtClean="0"/>
           </a:p>
           <a:p>
             <a:pPr lvl="3"/>
@@ -867,6 +854,7 @@
               <a:rPr lang="en-US" smtClean="0"/>
               <a:t>Fourth level</a:t>
             </a:r>
+            <a:endParaRPr lang="en-US" smtClean="0"/>
           </a:p>
           <a:p>
             <a:pPr lvl="4"/>
@@ -895,7 +883,6 @@
           <a:p>
             <a:fld id="{3B8B625B-F59E-409E-853D-5E09BE81799E}" type="datetimeFigureOut">
               <a:rPr lang="en-US" smtClean="0"/>
-              <a:t>7/5/2019</a:t>
             </a:fld>
             <a:endParaRPr lang="en-US"/>
           </a:p>
@@ -937,18 +924,12 @@
           <a:p>
             <a:fld id="{056E25EC-DDEA-4498-BD1F-8AD8CE522305}" type="slidenum">
               <a:rPr lang="en-US" smtClean="0"/>
-              <a:t>‹#›</a:t>
             </a:fld>
             <a:endParaRPr lang="en-US"/>
           </a:p>
         </p:txBody>
       </p:sp>
     </p:spTree>
-    <p:extLst>
-      <p:ext uri="{BB962C8B-B14F-4D97-AF65-F5344CB8AC3E}">
-        <p14:creationId xmlns:p14="http://schemas.microsoft.com/office/powerpoint/2010/main" val="1295913549"/>
-      </p:ext>
-    </p:extLst>
   </p:cSld>
   <p:clrMapOvr>
     <a:masterClrMapping/>
@@ -1026,6 +1007,7 @@
               <a:rPr lang="en-US" smtClean="0"/>
               <a:t>Click to edit Master text styles</a:t>
             </a:r>
+            <a:endParaRPr lang="en-US" smtClean="0"/>
           </a:p>
           <a:p>
             <a:pPr lvl="1"/>
@@ -1033,6 +1015,7 @@
               <a:rPr lang="en-US" smtClean="0"/>
               <a:t>Second level</a:t>
             </a:r>
+            <a:endParaRPr lang="en-US" smtClean="0"/>
           </a:p>
           <a:p>
             <a:pPr lvl="2"/>
@@ -1040,6 +1023,7 @@
               <a:rPr lang="en-US" smtClean="0"/>
               <a:t>Third level</a:t>
             </a:r>
+            <a:endParaRPr lang="en-US" smtClean="0"/>
           </a:p>
           <a:p>
             <a:pPr lvl="3"/>
@@ -1047,6 +1031,7 @@
               <a:rPr lang="en-US" smtClean="0"/>
               <a:t>Fourth level</a:t>
             </a:r>
+            <a:endParaRPr lang="en-US" smtClean="0"/>
           </a:p>
           <a:p>
             <a:pPr lvl="4"/>
@@ -1075,7 +1060,6 @@
           <a:p>
             <a:fld id="{3B8B625B-F59E-409E-853D-5E09BE81799E}" type="datetimeFigureOut">
               <a:rPr lang="en-US" smtClean="0"/>
-              <a:t>7/5/2019</a:t>
             </a:fld>
             <a:endParaRPr lang="en-US"/>
           </a:p>
@@ -1117,18 +1101,12 @@
           <a:p>
             <a:fld id="{056E25EC-DDEA-4498-BD1F-8AD8CE522305}" type="slidenum">
               <a:rPr lang="en-US" smtClean="0"/>
-              <a:t>‹#›</a:t>
             </a:fld>
             <a:endParaRPr lang="en-US"/>
           </a:p>
         </p:txBody>
       </p:sp>
     </p:spTree>
-    <p:extLst>
-      <p:ext uri="{BB962C8B-B14F-4D97-AF65-F5344CB8AC3E}">
-        <p14:creationId xmlns:p14="http://schemas.microsoft.com/office/powerpoint/2010/main" val="2894583303"/>
-      </p:ext>
-    </p:extLst>
   </p:cSld>
   <p:clrMapOvr>
     <a:masterClrMapping/>
@@ -1196,6 +1174,7 @@
               <a:rPr lang="en-US" smtClean="0"/>
               <a:t>Click to edit Master text styles</a:t>
             </a:r>
+            <a:endParaRPr lang="en-US" smtClean="0"/>
           </a:p>
           <a:p>
             <a:pPr lvl="1"/>
@@ -1203,6 +1182,7 @@
               <a:rPr lang="en-US" smtClean="0"/>
               <a:t>Second level</a:t>
             </a:r>
+            <a:endParaRPr lang="en-US" smtClean="0"/>
           </a:p>
           <a:p>
             <a:pPr lvl="2"/>
@@ -1210,6 +1190,7 @@
               <a:rPr lang="en-US" smtClean="0"/>
               <a:t>Third level</a:t>
             </a:r>
+            <a:endParaRPr lang="en-US" smtClean="0"/>
           </a:p>
           <a:p>
             <a:pPr lvl="3"/>
@@ -1217,6 +1198,7 @@
               <a:rPr lang="en-US" smtClean="0"/>
               <a:t>Fourth level</a:t>
             </a:r>
+            <a:endParaRPr lang="en-US" smtClean="0"/>
           </a:p>
           <a:p>
             <a:pPr lvl="4"/>
@@ -1245,7 +1227,6 @@
           <a:p>
             <a:fld id="{3B8B625B-F59E-409E-853D-5E09BE81799E}" type="datetimeFigureOut">
               <a:rPr lang="en-US" smtClean="0"/>
-              <a:t>7/5/2019</a:t>
             </a:fld>
             <a:endParaRPr lang="en-US"/>
           </a:p>
@@ -1287,18 +1268,12 @@
           <a:p>
             <a:fld id="{056E25EC-DDEA-4498-BD1F-8AD8CE522305}" type="slidenum">
               <a:rPr lang="en-US" smtClean="0"/>
-              <a:t>‹#›</a:t>
             </a:fld>
             <a:endParaRPr lang="en-US"/>
           </a:p>
         </p:txBody>
       </p:sp>
     </p:spTree>
-    <p:extLst>
-      <p:ext uri="{BB962C8B-B14F-4D97-AF65-F5344CB8AC3E}">
-        <p14:creationId xmlns:p14="http://schemas.microsoft.com/office/powerpoint/2010/main" val="198741166"/>
-      </p:ext>
-    </p:extLst>
   </p:cSld>
   <p:clrMapOvr>
     <a:masterClrMapping/>
@@ -1471,6 +1446,7 @@
               <a:rPr lang="en-US" smtClean="0"/>
               <a:t>Click to edit Master text styles</a:t>
             </a:r>
+            <a:endParaRPr lang="en-US" smtClean="0"/>
           </a:p>
         </p:txBody>
       </p:sp>
@@ -1491,7 +1467,6 @@
           <a:p>
             <a:fld id="{3B8B625B-F59E-409E-853D-5E09BE81799E}" type="datetimeFigureOut">
               <a:rPr lang="en-US" smtClean="0"/>
-              <a:t>7/5/2019</a:t>
             </a:fld>
             <a:endParaRPr lang="en-US"/>
           </a:p>
@@ -1533,18 +1508,12 @@
           <a:p>
             <a:fld id="{056E25EC-DDEA-4498-BD1F-8AD8CE522305}" type="slidenum">
               <a:rPr lang="en-US" smtClean="0"/>
-              <a:t>‹#›</a:t>
             </a:fld>
             <a:endParaRPr lang="en-US"/>
           </a:p>
         </p:txBody>
       </p:sp>
     </p:spTree>
-    <p:extLst>
-      <p:ext uri="{BB962C8B-B14F-4D97-AF65-F5344CB8AC3E}">
-        <p14:creationId xmlns:p14="http://schemas.microsoft.com/office/powerpoint/2010/main" val="2922922305"/>
-      </p:ext>
-    </p:extLst>
   </p:cSld>
   <p:clrMapOvr>
     <a:masterClrMapping/>
@@ -1645,6 +1614,7 @@
               <a:rPr lang="en-US" smtClean="0"/>
               <a:t>Click to edit Master text styles</a:t>
             </a:r>
+            <a:endParaRPr lang="en-US" smtClean="0"/>
           </a:p>
           <a:p>
             <a:pPr lvl="1"/>
@@ -1652,6 +1622,7 @@
               <a:rPr lang="en-US" smtClean="0"/>
               <a:t>Second level</a:t>
             </a:r>
+            <a:endParaRPr lang="en-US" smtClean="0"/>
           </a:p>
           <a:p>
             <a:pPr lvl="2"/>
@@ -1659,6 +1630,7 @@
               <a:rPr lang="en-US" smtClean="0"/>
               <a:t>Third level</a:t>
             </a:r>
+            <a:endParaRPr lang="en-US" smtClean="0"/>
           </a:p>
           <a:p>
             <a:pPr lvl="3"/>
@@ -1666,6 +1638,7 @@
               <a:rPr lang="en-US" smtClean="0"/>
               <a:t>Fourth level</a:t>
             </a:r>
+            <a:endParaRPr lang="en-US" smtClean="0"/>
           </a:p>
           <a:p>
             <a:pPr lvl="4"/>
@@ -1730,6 +1703,7 @@
               <a:rPr lang="en-US" smtClean="0"/>
               <a:t>Click to edit Master text styles</a:t>
             </a:r>
+            <a:endParaRPr lang="en-US" smtClean="0"/>
           </a:p>
           <a:p>
             <a:pPr lvl="1"/>
@@ -1737,6 +1711,7 @@
               <a:rPr lang="en-US" smtClean="0"/>
               <a:t>Second level</a:t>
             </a:r>
+            <a:endParaRPr lang="en-US" smtClean="0"/>
           </a:p>
           <a:p>
             <a:pPr lvl="2"/>
@@ -1744,6 +1719,7 @@
               <a:rPr lang="en-US" smtClean="0"/>
               <a:t>Third level</a:t>
             </a:r>
+            <a:endParaRPr lang="en-US" smtClean="0"/>
           </a:p>
           <a:p>
             <a:pPr lvl="3"/>
@@ -1751,6 +1727,7 @@
               <a:rPr lang="en-US" smtClean="0"/>
               <a:t>Fourth level</a:t>
             </a:r>
+            <a:endParaRPr lang="en-US" smtClean="0"/>
           </a:p>
           <a:p>
             <a:pPr lvl="4"/>
@@ -1779,7 +1756,6 @@
           <a:p>
             <a:fld id="{3B8B625B-F59E-409E-853D-5E09BE81799E}" type="datetimeFigureOut">
               <a:rPr lang="en-US" smtClean="0"/>
-              <a:t>7/5/2019</a:t>
             </a:fld>
             <a:endParaRPr lang="en-US"/>
           </a:p>
@@ -1821,18 +1797,12 @@
           <a:p>
             <a:fld id="{056E25EC-DDEA-4498-BD1F-8AD8CE522305}" type="slidenum">
               <a:rPr lang="en-US" smtClean="0"/>
-              <a:t>‹#›</a:t>
             </a:fld>
             <a:endParaRPr lang="en-US"/>
           </a:p>
         </p:txBody>
       </p:sp>
     </p:spTree>
-    <p:extLst>
-      <p:ext uri="{BB962C8B-B14F-4D97-AF65-F5344CB8AC3E}">
-        <p14:creationId xmlns:p14="http://schemas.microsoft.com/office/powerpoint/2010/main" val="785323428"/>
-      </p:ext>
-    </p:extLst>
   </p:cSld>
   <p:clrMapOvr>
     <a:masterClrMapping/>
@@ -1946,6 +1916,7 @@
               <a:rPr lang="en-US" smtClean="0"/>
               <a:t>Click to edit Master text styles</a:t>
             </a:r>
+            <a:endParaRPr lang="en-US" smtClean="0"/>
           </a:p>
         </p:txBody>
       </p:sp>
@@ -2002,6 +1973,7 @@
               <a:rPr lang="en-US" smtClean="0"/>
               <a:t>Click to edit Master text styles</a:t>
             </a:r>
+            <a:endParaRPr lang="en-US" smtClean="0"/>
           </a:p>
           <a:p>
             <a:pPr lvl="1"/>
@@ -2009,6 +1981,7 @@
               <a:rPr lang="en-US" smtClean="0"/>
               <a:t>Second level</a:t>
             </a:r>
+            <a:endParaRPr lang="en-US" smtClean="0"/>
           </a:p>
           <a:p>
             <a:pPr lvl="2"/>
@@ -2016,6 +1989,7 @@
               <a:rPr lang="en-US" smtClean="0"/>
               <a:t>Third level</a:t>
             </a:r>
+            <a:endParaRPr lang="en-US" smtClean="0"/>
           </a:p>
           <a:p>
             <a:pPr lvl="3"/>
@@ -2023,6 +1997,7 @@
               <a:rPr lang="en-US" smtClean="0"/>
               <a:t>Fourth level</a:t>
             </a:r>
+            <a:endParaRPr lang="en-US" smtClean="0"/>
           </a:p>
           <a:p>
             <a:pPr lvl="4"/>
@@ -2096,6 +2071,7 @@
               <a:rPr lang="en-US" smtClean="0"/>
               <a:t>Click to edit Master text styles</a:t>
             </a:r>
+            <a:endParaRPr lang="en-US" smtClean="0"/>
           </a:p>
         </p:txBody>
       </p:sp>
@@ -2152,6 +2128,7 @@
               <a:rPr lang="en-US" smtClean="0"/>
               <a:t>Click to edit Master text styles</a:t>
             </a:r>
+            <a:endParaRPr lang="en-US" smtClean="0"/>
           </a:p>
           <a:p>
             <a:pPr lvl="1"/>
@@ -2159,6 +2136,7 @@
               <a:rPr lang="en-US" smtClean="0"/>
               <a:t>Second level</a:t>
             </a:r>
+            <a:endParaRPr lang="en-US" smtClean="0"/>
           </a:p>
           <a:p>
             <a:pPr lvl="2"/>
@@ -2166,6 +2144,7 @@
               <a:rPr lang="en-US" smtClean="0"/>
               <a:t>Third level</a:t>
             </a:r>
+            <a:endParaRPr lang="en-US" smtClean="0"/>
           </a:p>
           <a:p>
             <a:pPr lvl="3"/>
@@ -2173,6 +2152,7 @@
               <a:rPr lang="en-US" smtClean="0"/>
               <a:t>Fourth level</a:t>
             </a:r>
+            <a:endParaRPr lang="en-US" smtClean="0"/>
           </a:p>
           <a:p>
             <a:pPr lvl="4"/>
@@ -2201,7 +2181,6 @@
           <a:p>
             <a:fld id="{3B8B625B-F59E-409E-853D-5E09BE81799E}" type="datetimeFigureOut">
               <a:rPr lang="en-US" smtClean="0"/>
-              <a:t>7/5/2019</a:t>
             </a:fld>
             <a:endParaRPr lang="en-US"/>
           </a:p>
@@ -2243,18 +2222,12 @@
           <a:p>
             <a:fld id="{056E25EC-DDEA-4498-BD1F-8AD8CE522305}" type="slidenum">
               <a:rPr lang="en-US" smtClean="0"/>
-              <a:t>‹#›</a:t>
             </a:fld>
             <a:endParaRPr lang="en-US"/>
           </a:p>
         </p:txBody>
       </p:sp>
     </p:spTree>
-    <p:extLst>
-      <p:ext uri="{BB962C8B-B14F-4D97-AF65-F5344CB8AC3E}">
-        <p14:creationId xmlns:p14="http://schemas.microsoft.com/office/powerpoint/2010/main" val="3866131463"/>
-      </p:ext>
-    </p:extLst>
   </p:cSld>
   <p:clrMapOvr>
     <a:masterClrMapping/>
@@ -2319,7 +2292,6 @@
           <a:p>
             <a:fld id="{3B8B625B-F59E-409E-853D-5E09BE81799E}" type="datetimeFigureOut">
               <a:rPr lang="en-US" smtClean="0"/>
-              <a:t>7/5/2019</a:t>
             </a:fld>
             <a:endParaRPr lang="en-US"/>
           </a:p>
@@ -2361,18 +2333,12 @@
           <a:p>
             <a:fld id="{056E25EC-DDEA-4498-BD1F-8AD8CE522305}" type="slidenum">
               <a:rPr lang="en-US" smtClean="0"/>
-              <a:t>‹#›</a:t>
             </a:fld>
             <a:endParaRPr lang="en-US"/>
           </a:p>
         </p:txBody>
       </p:sp>
     </p:spTree>
-    <p:extLst>
-      <p:ext uri="{BB962C8B-B14F-4D97-AF65-F5344CB8AC3E}">
-        <p14:creationId xmlns:p14="http://schemas.microsoft.com/office/powerpoint/2010/main" val="1469507755"/>
-      </p:ext>
-    </p:extLst>
   </p:cSld>
   <p:clrMapOvr>
     <a:masterClrMapping/>
@@ -2414,7 +2380,6 @@
           <a:p>
             <a:fld id="{3B8B625B-F59E-409E-853D-5E09BE81799E}" type="datetimeFigureOut">
               <a:rPr lang="en-US" smtClean="0"/>
-              <a:t>7/5/2019</a:t>
             </a:fld>
             <a:endParaRPr lang="en-US"/>
           </a:p>
@@ -2456,18 +2421,12 @@
           <a:p>
             <a:fld id="{056E25EC-DDEA-4498-BD1F-8AD8CE522305}" type="slidenum">
               <a:rPr lang="en-US" smtClean="0"/>
-              <a:t>‹#›</a:t>
             </a:fld>
             <a:endParaRPr lang="en-US"/>
           </a:p>
         </p:txBody>
       </p:sp>
     </p:spTree>
-    <p:extLst>
-      <p:ext uri="{BB962C8B-B14F-4D97-AF65-F5344CB8AC3E}">
-        <p14:creationId xmlns:p14="http://schemas.microsoft.com/office/powerpoint/2010/main" val="1239609478"/>
-      </p:ext>
-    </p:extLst>
   </p:cSld>
   <p:clrMapOvr>
     <a:masterClrMapping/>
@@ -2577,6 +2536,7 @@
               <a:rPr lang="en-US" smtClean="0"/>
               <a:t>Click to edit Master text styles</a:t>
             </a:r>
+            <a:endParaRPr lang="en-US" smtClean="0"/>
           </a:p>
           <a:p>
             <a:pPr lvl="1"/>
@@ -2584,6 +2544,7 @@
               <a:rPr lang="en-US" smtClean="0"/>
               <a:t>Second level</a:t>
             </a:r>
+            <a:endParaRPr lang="en-US" smtClean="0"/>
           </a:p>
           <a:p>
             <a:pPr lvl="2"/>
@@ -2591,6 +2552,7 @@
               <a:rPr lang="en-US" smtClean="0"/>
               <a:t>Third level</a:t>
             </a:r>
+            <a:endParaRPr lang="en-US" smtClean="0"/>
           </a:p>
           <a:p>
             <a:pPr lvl="3"/>
@@ -2598,6 +2560,7 @@
               <a:rPr lang="en-US" smtClean="0"/>
               <a:t>Fourth level</a:t>
             </a:r>
+            <a:endParaRPr lang="en-US" smtClean="0"/>
           </a:p>
           <a:p>
             <a:pPr lvl="4"/>
@@ -2671,6 +2634,7 @@
               <a:rPr lang="en-US" smtClean="0"/>
               <a:t>Click to edit Master text styles</a:t>
             </a:r>
+            <a:endParaRPr lang="en-US" smtClean="0"/>
           </a:p>
         </p:txBody>
       </p:sp>
@@ -2691,7 +2655,6 @@
           <a:p>
             <a:fld id="{3B8B625B-F59E-409E-853D-5E09BE81799E}" type="datetimeFigureOut">
               <a:rPr lang="en-US" smtClean="0"/>
-              <a:t>7/5/2019</a:t>
             </a:fld>
             <a:endParaRPr lang="en-US"/>
           </a:p>
@@ -2733,18 +2696,12 @@
           <a:p>
             <a:fld id="{056E25EC-DDEA-4498-BD1F-8AD8CE522305}" type="slidenum">
               <a:rPr lang="en-US" smtClean="0"/>
-              <a:t>‹#›</a:t>
             </a:fld>
             <a:endParaRPr lang="en-US"/>
           </a:p>
         </p:txBody>
       </p:sp>
     </p:spTree>
-    <p:extLst>
-      <p:ext uri="{BB962C8B-B14F-4D97-AF65-F5344CB8AC3E}">
-        <p14:creationId xmlns:p14="http://schemas.microsoft.com/office/powerpoint/2010/main" val="3945335307"/>
-      </p:ext>
-    </p:extLst>
   </p:cSld>
   <p:clrMapOvr>
     <a:masterClrMapping/>
@@ -2924,6 +2881,7 @@
               <a:rPr lang="en-US" smtClean="0"/>
               <a:t>Click to edit Master text styles</a:t>
             </a:r>
+            <a:endParaRPr lang="en-US" smtClean="0"/>
           </a:p>
         </p:txBody>
       </p:sp>
@@ -2944,7 +2902,6 @@
           <a:p>
             <a:fld id="{3B8B625B-F59E-409E-853D-5E09BE81799E}" type="datetimeFigureOut">
               <a:rPr lang="en-US" smtClean="0"/>
-              <a:t>7/5/2019</a:t>
             </a:fld>
             <a:endParaRPr lang="en-US"/>
           </a:p>
@@ -2986,18 +2943,12 @@
           <a:p>
             <a:fld id="{056E25EC-DDEA-4498-BD1F-8AD8CE522305}" type="slidenum">
               <a:rPr lang="en-US" smtClean="0"/>
-              <a:t>‹#›</a:t>
             </a:fld>
             <a:endParaRPr lang="en-US"/>
           </a:p>
         </p:txBody>
       </p:sp>
     </p:spTree>
-    <p:extLst>
-      <p:ext uri="{BB962C8B-B14F-4D97-AF65-F5344CB8AC3E}">
-        <p14:creationId xmlns:p14="http://schemas.microsoft.com/office/powerpoint/2010/main" val="1488803761"/>
-      </p:ext>
-    </p:extLst>
   </p:cSld>
   <p:clrMapOvr>
     <a:masterClrMapping/>
@@ -3090,6 +3041,7 @@
               <a:rPr lang="en-US" smtClean="0"/>
               <a:t>Click to edit Master text styles</a:t>
             </a:r>
+            <a:endParaRPr lang="en-US" smtClean="0"/>
           </a:p>
           <a:p>
             <a:pPr lvl="1"/>
@@ -3097,6 +3049,7 @@
               <a:rPr lang="en-US" smtClean="0"/>
               <a:t>Second level</a:t>
             </a:r>
+            <a:endParaRPr lang="en-US" smtClean="0"/>
           </a:p>
           <a:p>
             <a:pPr lvl="2"/>
@@ -3104,6 +3057,7 @@
               <a:rPr lang="en-US" smtClean="0"/>
               <a:t>Third level</a:t>
             </a:r>
+            <a:endParaRPr lang="en-US" smtClean="0"/>
           </a:p>
           <a:p>
             <a:pPr lvl="3"/>
@@ -3111,6 +3065,7 @@
               <a:rPr lang="en-US" smtClean="0"/>
               <a:t>Fourth level</a:t>
             </a:r>
+            <a:endParaRPr lang="en-US" smtClean="0"/>
           </a:p>
           <a:p>
             <a:pPr lvl="4"/>
@@ -3157,7 +3112,6 @@
           <a:p>
             <a:fld id="{3B8B625B-F59E-409E-853D-5E09BE81799E}" type="datetimeFigureOut">
               <a:rPr lang="en-US" smtClean="0"/>
-              <a:t>7/5/2019</a:t>
             </a:fld>
             <a:endParaRPr lang="en-US"/>
           </a:p>
@@ -3235,18 +3189,12 @@
           <a:p>
             <a:fld id="{056E25EC-DDEA-4498-BD1F-8AD8CE522305}" type="slidenum">
               <a:rPr lang="en-US" smtClean="0"/>
-              <a:t>‹#›</a:t>
             </a:fld>
             <a:endParaRPr lang="en-US"/>
           </a:p>
         </p:txBody>
       </p:sp>
     </p:spTree>
-    <p:extLst>
-      <p:ext uri="{BB962C8B-B14F-4D97-AF65-F5344CB8AC3E}">
-        <p14:creationId xmlns:p14="http://schemas.microsoft.com/office/powerpoint/2010/main" val="259611078"/>
-      </p:ext>
-    </p:extLst>
   </p:cSld>
   <p:clrMap bg1="lt1" tx1="dk1" bg2="lt2" tx2="dk2" accent1="accent1" accent2="accent2" accent3="accent3" accent4="accent4" accent5="accent5" accent6="accent6" hlink="hlink" folHlink="folHlink"/>
   <p:sldLayoutIdLst>
@@ -3284,7 +3232,7 @@
         <a:spcBef>
           <a:spcPct val="20000"/>
         </a:spcBef>
-        <a:buFont typeface="Arial" pitchFamily="34" charset="0"/>
+        <a:buFont typeface="Arial" panose="020B0604020202020204" pitchFamily="34" charset="0"/>
         <a:buChar char="•"/>
         <a:defRPr sz="3200" kern="1200">
           <a:solidFill>
@@ -3299,7 +3247,7 @@
         <a:spcBef>
           <a:spcPct val="20000"/>
         </a:spcBef>
-        <a:buFont typeface="Arial" pitchFamily="34" charset="0"/>
+        <a:buFont typeface="Arial" panose="020B0604020202020204" pitchFamily="34" charset="0"/>
         <a:buChar char="–"/>
         <a:defRPr sz="2800" kern="1200">
           <a:solidFill>
@@ -3314,7 +3262,7 @@
         <a:spcBef>
           <a:spcPct val="20000"/>
         </a:spcBef>
-        <a:buFont typeface="Arial" pitchFamily="34" charset="0"/>
+        <a:buFont typeface="Arial" panose="020B0604020202020204" pitchFamily="34" charset="0"/>
         <a:buChar char="•"/>
         <a:defRPr sz="2400" kern="1200">
           <a:solidFill>
@@ -3329,7 +3277,7 @@
         <a:spcBef>
           <a:spcPct val="20000"/>
         </a:spcBef>
-        <a:buFont typeface="Arial" pitchFamily="34" charset="0"/>
+        <a:buFont typeface="Arial" panose="020B0604020202020204" pitchFamily="34" charset="0"/>
         <a:buChar char="–"/>
         <a:defRPr sz="2000" kern="1200">
           <a:solidFill>
@@ -3344,7 +3292,7 @@
         <a:spcBef>
           <a:spcPct val="20000"/>
         </a:spcBef>
-        <a:buFont typeface="Arial" pitchFamily="34" charset="0"/>
+        <a:buFont typeface="Arial" panose="020B0604020202020204" pitchFamily="34" charset="0"/>
         <a:buChar char="»"/>
         <a:defRPr sz="2000" kern="1200">
           <a:solidFill>
@@ -3359,7 +3307,7 @@
         <a:spcBef>
           <a:spcPct val="20000"/>
         </a:spcBef>
-        <a:buFont typeface="Arial" pitchFamily="34" charset="0"/>
+        <a:buFont typeface="Arial" panose="020B0604020202020204" pitchFamily="34" charset="0"/>
         <a:buChar char="•"/>
         <a:defRPr sz="2000" kern="1200">
           <a:solidFill>
@@ -3374,7 +3322,7 @@
         <a:spcBef>
           <a:spcPct val="20000"/>
         </a:spcBef>
-        <a:buFont typeface="Arial" pitchFamily="34" charset="0"/>
+        <a:buFont typeface="Arial" panose="020B0604020202020204" pitchFamily="34" charset="0"/>
         <a:buChar char="•"/>
         <a:defRPr sz="2000" kern="1200">
           <a:solidFill>
@@ -3389,7 +3337,7 @@
         <a:spcBef>
           <a:spcPct val="20000"/>
         </a:spcBef>
-        <a:buFont typeface="Arial" pitchFamily="34" charset="0"/>
+        <a:buFont typeface="Arial" panose="020B0604020202020204" pitchFamily="34" charset="0"/>
         <a:buChar char="•"/>
         <a:defRPr sz="2000" kern="1200">
           <a:solidFill>
@@ -3404,7 +3352,7 @@
         <a:spcBef>
           <a:spcPct val="20000"/>
         </a:spcBef>
-        <a:buFont typeface="Arial" pitchFamily="34" charset="0"/>
+        <a:buFont typeface="Arial" panose="020B0604020202020204" pitchFamily="34" charset="0"/>
         <a:buChar char="•"/>
         <a:defRPr sz="2000" kern="1200">
           <a:solidFill>
@@ -3587,6 +3535,11 @@
               </a:rPr>
               <a:t>MaCumRap</a:t>
             </a:r>
+            <a:endParaRPr lang="en-US" sz="1200" dirty="0" smtClean="0">
+              <a:solidFill>
+                <a:schemeClr val="tx1"/>
+              </a:solidFill>
+            </a:endParaRPr>
           </a:p>
           <a:p>
             <a:pPr marL="171450" indent="-171450">
@@ -3601,6 +3554,11 @@
               </a:rPr>
               <a:t>TenCumRap</a:t>
             </a:r>
+            <a:endParaRPr lang="en-US" sz="1200" dirty="0" smtClean="0">
+              <a:solidFill>
+                <a:schemeClr val="tx1"/>
+              </a:solidFill>
+            </a:endParaRPr>
           </a:p>
           <a:p>
             <a:pPr marL="171450" indent="-171450">
@@ -3691,8 +3649,8 @@
         </p:nvSpPr>
         <p:spPr>
           <a:xfrm>
-            <a:off x="3016250" y="800225"/>
-            <a:ext cx="1143000" cy="1427196"/>
+            <a:off x="2895600" y="800100"/>
+            <a:ext cx="1263650" cy="1427480"/>
           </a:xfrm>
           <a:prstGeom prst="rect">
             <a:avLst/>
@@ -3738,6 +3696,11 @@
               </a:rPr>
               <a:t>MaRap</a:t>
             </a:r>
+            <a:endParaRPr lang="en-US" sz="1200" dirty="0" smtClean="0">
+              <a:solidFill>
+                <a:schemeClr val="tx1"/>
+              </a:solidFill>
+            </a:endParaRPr>
           </a:p>
           <a:p>
             <a:pPr marL="171450" indent="-171450">
@@ -3752,6 +3715,11 @@
               </a:rPr>
               <a:t>TenRap</a:t>
             </a:r>
+            <a:endParaRPr lang="en-US" sz="1200" dirty="0" smtClean="0">
+              <a:solidFill>
+                <a:schemeClr val="tx1"/>
+              </a:solidFill>
+            </a:endParaRPr>
           </a:p>
           <a:p>
             <a:pPr marL="171450" indent="-171450">
@@ -3808,6 +3776,11 @@
               </a:rPr>
               <a:t>ThongTin</a:t>
             </a:r>
+            <a:endParaRPr lang="en-US" sz="1200" dirty="0" smtClean="0">
+              <a:solidFill>
+                <a:schemeClr val="tx1"/>
+              </a:solidFill>
+            </a:endParaRPr>
           </a:p>
           <a:p>
             <a:pPr marL="171450" indent="-171450">
@@ -3822,6 +3795,11 @@
               </a:rPr>
               <a:t>HinhAnh</a:t>
             </a:r>
+            <a:endParaRPr lang="en-US" sz="1200" dirty="0" smtClean="0">
+              <a:solidFill>
+                <a:schemeClr val="tx1"/>
+              </a:solidFill>
+            </a:endParaRPr>
           </a:p>
           <a:p>
             <a:pPr marL="171450" indent="-171450">
@@ -3852,8 +3830,8 @@
         </p:nvSpPr>
         <p:spPr>
           <a:xfrm>
-            <a:off x="3016250" y="571626"/>
-            <a:ext cx="1143000" cy="228600"/>
+            <a:off x="2895600" y="571500"/>
+            <a:ext cx="1263650" cy="228600"/>
           </a:xfrm>
           <a:prstGeom prst="rect">
             <a:avLst/>
@@ -3959,6 +3937,11 @@
               </a:rPr>
               <a:t>MaPhong</a:t>
             </a:r>
+            <a:endParaRPr lang="en-US" sz="1200" dirty="0" smtClean="0">
+              <a:solidFill>
+                <a:schemeClr val="tx1"/>
+              </a:solidFill>
+            </a:endParaRPr>
           </a:p>
           <a:p>
             <a:pPr marL="171450" indent="-171450">
@@ -3973,6 +3956,11 @@
               </a:rPr>
               <a:t>TenPhong</a:t>
             </a:r>
+            <a:endParaRPr lang="en-US" sz="1200" dirty="0" smtClean="0">
+              <a:solidFill>
+                <a:schemeClr val="tx1"/>
+              </a:solidFill>
+            </a:endParaRPr>
           </a:p>
           <a:p>
             <a:pPr marL="171450" indent="-171450">
@@ -3985,8 +3973,32 @@
                   <a:schemeClr val="tx1"/>
                 </a:solidFill>
               </a:rPr>
-              <a:t>SoLuongGhe</a:t>
-            </a:r>
+              <a:t>SoLuong</a:t>
+            </a:r>
+            <a:endParaRPr lang="en-US" sz="1200" dirty="0" smtClean="0">
+              <a:solidFill>
+                <a:schemeClr val="tx1"/>
+              </a:solidFill>
+            </a:endParaRPr>
+          </a:p>
+          <a:p>
+            <a:pPr marL="171450" indent="-171450">
+              <a:buFontTx/>
+              <a:buChar char="-"/>
+            </a:pPr>
+            <a:r>
+              <a:rPr lang="en-US" sz="1200" dirty="0" smtClean="0">
+                <a:solidFill>
+                  <a:schemeClr val="tx1"/>
+                </a:solidFill>
+              </a:rPr>
+              <a:t>Ghe</a:t>
+            </a:r>
+            <a:endParaRPr lang="en-US" sz="1200" dirty="0" smtClean="0">
+              <a:solidFill>
+                <a:schemeClr val="tx1"/>
+              </a:solidFill>
+            </a:endParaRPr>
           </a:p>
           <a:p>
             <a:pPr marL="171450" indent="-171450">
@@ -4124,6 +4136,11 @@
               </a:rPr>
               <a:t>MaQuyen</a:t>
             </a:r>
+            <a:endParaRPr lang="en-US" sz="1200" dirty="0" smtClean="0">
+              <a:solidFill>
+                <a:schemeClr val="tx1"/>
+              </a:solidFill>
+            </a:endParaRPr>
           </a:p>
           <a:p>
             <a:pPr marL="171450" indent="-171450">
@@ -4138,6 +4155,11 @@
               </a:rPr>
               <a:t>TenQuyen</a:t>
             </a:r>
+            <a:endParaRPr lang="en-US" sz="1200" dirty="0" smtClean="0">
+              <a:solidFill>
+                <a:schemeClr val="tx1"/>
+              </a:solidFill>
+            </a:endParaRPr>
           </a:p>
           <a:p>
             <a:pPr marL="171450" indent="-171450">
@@ -4275,6 +4297,11 @@
               </a:rPr>
               <a:t>Id</a:t>
             </a:r>
+            <a:endParaRPr lang="en-US" sz="1200" dirty="0" smtClean="0">
+              <a:solidFill>
+                <a:schemeClr val="tx1"/>
+              </a:solidFill>
+            </a:endParaRPr>
           </a:p>
           <a:p>
             <a:pPr marL="171450" indent="-171450">
@@ -4289,6 +4316,11 @@
               </a:rPr>
               <a:t>Email</a:t>
             </a:r>
+            <a:endParaRPr lang="en-US" sz="1200" dirty="0" smtClean="0">
+              <a:solidFill>
+                <a:schemeClr val="tx1"/>
+              </a:solidFill>
+            </a:endParaRPr>
           </a:p>
           <a:p>
             <a:pPr marL="171450" indent="-171450">
@@ -4303,6 +4335,11 @@
               </a:rPr>
               <a:t>MatKhau</a:t>
             </a:r>
+            <a:endParaRPr lang="en-US" sz="1200" dirty="0" smtClean="0">
+              <a:solidFill>
+                <a:schemeClr val="tx1"/>
+              </a:solidFill>
+            </a:endParaRPr>
           </a:p>
           <a:p>
             <a:pPr marL="171450" indent="-171450">
@@ -4317,6 +4354,11 @@
               </a:rPr>
               <a:t>HoTen</a:t>
             </a:r>
+            <a:endParaRPr lang="en-US" sz="1200" dirty="0" smtClean="0">
+              <a:solidFill>
+                <a:schemeClr val="tx1"/>
+              </a:solidFill>
+            </a:endParaRPr>
           </a:p>
           <a:p>
             <a:pPr marL="171450" indent="-171450">
@@ -4331,6 +4373,11 @@
               </a:rPr>
               <a:t>DiaChi</a:t>
             </a:r>
+            <a:endParaRPr lang="en-US" sz="1200" dirty="0" smtClean="0">
+              <a:solidFill>
+                <a:schemeClr val="tx1"/>
+              </a:solidFill>
+            </a:endParaRPr>
           </a:p>
           <a:p>
             <a:pPr marL="171450" indent="-171450">
@@ -4345,6 +4392,11 @@
               </a:rPr>
               <a:t>SoDT</a:t>
             </a:r>
+            <a:endParaRPr lang="en-US" sz="1200" dirty="0" smtClean="0">
+              <a:solidFill>
+                <a:schemeClr val="tx1"/>
+              </a:solidFill>
+            </a:endParaRPr>
           </a:p>
           <a:p>
             <a:pPr marL="171450" indent="-171450">
@@ -4359,6 +4411,11 @@
               </a:rPr>
               <a:t>Avatar</a:t>
             </a:r>
+            <a:endParaRPr lang="en-US" sz="1200" dirty="0" smtClean="0">
+              <a:solidFill>
+                <a:schemeClr val="tx1"/>
+              </a:solidFill>
+            </a:endParaRPr>
           </a:p>
           <a:p>
             <a:pPr marL="171450" indent="-171450">
@@ -4373,6 +4430,11 @@
               </a:rPr>
               <a:t>MaQuyen</a:t>
             </a:r>
+            <a:endParaRPr lang="en-US" sz="1200" dirty="0" smtClean="0">
+              <a:solidFill>
+                <a:schemeClr val="tx1"/>
+              </a:solidFill>
+            </a:endParaRPr>
           </a:p>
         </p:txBody>
       </p:sp>
@@ -4491,6 +4553,11 @@
               </a:rPr>
               <a:t>MaLoaiGhe</a:t>
             </a:r>
+            <a:endParaRPr lang="en-US" sz="1200" dirty="0" smtClean="0">
+              <a:solidFill>
+                <a:schemeClr val="tx1"/>
+              </a:solidFill>
+            </a:endParaRPr>
           </a:p>
           <a:p>
             <a:pPr marL="171450" indent="-171450">
@@ -4505,6 +4572,11 @@
               </a:rPr>
               <a:t>TenLoaiGhe</a:t>
             </a:r>
+            <a:endParaRPr lang="en-US" sz="1200" dirty="0" smtClean="0">
+              <a:solidFill>
+                <a:schemeClr val="tx1"/>
+              </a:solidFill>
+            </a:endParaRPr>
           </a:p>
           <a:p>
             <a:pPr marL="171450" indent="-171450">
@@ -4642,6 +4714,11 @@
               </a:rPr>
               <a:t>MaGhe</a:t>
             </a:r>
+            <a:endParaRPr lang="en-US" sz="1200" dirty="0" smtClean="0">
+              <a:solidFill>
+                <a:schemeClr val="tx1"/>
+              </a:solidFill>
+            </a:endParaRPr>
           </a:p>
           <a:p>
             <a:pPr marL="171450" indent="-171450">
@@ -4656,6 +4733,11 @@
               </a:rPr>
               <a:t>TenGhe</a:t>
             </a:r>
+            <a:endParaRPr lang="en-US" sz="1200" dirty="0" smtClean="0">
+              <a:solidFill>
+                <a:schemeClr val="tx1"/>
+              </a:solidFill>
+            </a:endParaRPr>
           </a:p>
           <a:p>
             <a:pPr marL="171450" indent="-171450">
@@ -4670,6 +4752,11 @@
               </a:rPr>
               <a:t>MaPhong</a:t>
             </a:r>
+            <a:endParaRPr lang="en-US" sz="1200" dirty="0" smtClean="0">
+              <a:solidFill>
+                <a:schemeClr val="tx1"/>
+              </a:solidFill>
+            </a:endParaRPr>
           </a:p>
           <a:p>
             <a:pPr marL="171450" indent="-171450">
@@ -4807,6 +4894,11 @@
               </a:rPr>
               <a:t>MaPhim</a:t>
             </a:r>
+            <a:endParaRPr lang="en-US" sz="1200" dirty="0" smtClean="0">
+              <a:solidFill>
+                <a:schemeClr val="tx1"/>
+              </a:solidFill>
+            </a:endParaRPr>
           </a:p>
           <a:p>
             <a:pPr marL="171450" indent="-171450">
@@ -4821,6 +4913,11 @@
               </a:rPr>
               <a:t>TenPhim</a:t>
             </a:r>
+            <a:endParaRPr lang="en-US" sz="1200" dirty="0" smtClean="0">
+              <a:solidFill>
+                <a:schemeClr val="tx1"/>
+              </a:solidFill>
+            </a:endParaRPr>
           </a:p>
           <a:p>
             <a:pPr marL="171450" indent="-171450">
@@ -4835,6 +4932,11 @@
               </a:rPr>
               <a:t>HinhAnh</a:t>
             </a:r>
+            <a:endParaRPr lang="en-US" sz="1200" dirty="0" smtClean="0">
+              <a:solidFill>
+                <a:schemeClr val="tx1"/>
+              </a:solidFill>
+            </a:endParaRPr>
           </a:p>
           <a:p>
             <a:pPr marL="171450" indent="-171450">
@@ -4849,6 +4951,11 @@
               </a:rPr>
               <a:t>Trailer</a:t>
             </a:r>
+            <a:endParaRPr lang="en-US" sz="1200" dirty="0" smtClean="0">
+              <a:solidFill>
+                <a:schemeClr val="tx1"/>
+              </a:solidFill>
+            </a:endParaRPr>
           </a:p>
           <a:p>
             <a:pPr marL="171450" indent="-171450">
@@ -4863,6 +4970,11 @@
               </a:rPr>
               <a:t>MoTa</a:t>
             </a:r>
+            <a:endParaRPr lang="en-US" sz="1200" dirty="0" smtClean="0">
+              <a:solidFill>
+                <a:schemeClr val="tx1"/>
+              </a:solidFill>
+            </a:endParaRPr>
           </a:p>
           <a:p>
             <a:pPr marL="171450" indent="-171450">
@@ -4877,6 +4989,11 @@
               </a:rPr>
               <a:t>NgayChieu</a:t>
             </a:r>
+            <a:endParaRPr lang="en-US" sz="1200" dirty="0" smtClean="0">
+              <a:solidFill>
+                <a:schemeClr val="tx1"/>
+              </a:solidFill>
+            </a:endParaRPr>
           </a:p>
           <a:p>
             <a:pPr marL="171450" indent="-171450">
@@ -4967,8 +5084,8 @@
         </p:nvSpPr>
         <p:spPr>
           <a:xfrm>
-            <a:off x="2209800" y="2922258"/>
-            <a:ext cx="1219200" cy="1371600"/>
+            <a:off x="2133600" y="2922270"/>
+            <a:ext cx="1295400" cy="1371600"/>
           </a:xfrm>
           <a:prstGeom prst="rect">
             <a:avLst/>
@@ -5012,8 +5129,29 @@
                   <a:schemeClr val="tx1"/>
                 </a:solidFill>
               </a:rPr>
-              <a:t>MaLichChieu</a:t>
-            </a:r>
+              <a:t>MaLichChi</a:t>
+            </a:r>
+            <a:r>
+              <a:rPr lang="" altLang="en-US" sz="1200" dirty="0" smtClean="0">
+                <a:solidFill>
+                  <a:schemeClr val="tx1"/>
+                </a:solidFill>
+              </a:rPr>
+              <a:t>e</a:t>
+            </a:r>
+            <a:r>
+              <a:rPr lang="en-US" sz="1200" dirty="0" smtClean="0">
+                <a:solidFill>
+                  <a:schemeClr val="tx1"/>
+                </a:solidFill>
+              </a:rPr>
+              <a:t>u</a:t>
+            </a:r>
+            <a:endParaRPr lang="en-US" sz="1200" dirty="0" smtClean="0">
+              <a:solidFill>
+                <a:schemeClr val="tx1"/>
+              </a:solidFill>
+            </a:endParaRPr>
           </a:p>
           <a:p>
             <a:pPr marL="171450" indent="-171450">
@@ -5028,6 +5166,11 @@
               </a:rPr>
               <a:t>MaPhong</a:t>
             </a:r>
+            <a:endParaRPr lang="en-US" sz="1200" dirty="0" smtClean="0">
+              <a:solidFill>
+                <a:schemeClr val="tx1"/>
+              </a:solidFill>
+            </a:endParaRPr>
           </a:p>
           <a:p>
             <a:pPr marL="171450" indent="-171450">
@@ -5042,6 +5185,11 @@
               </a:rPr>
               <a:t>MaPhim</a:t>
             </a:r>
+            <a:endParaRPr lang="en-US" sz="1200" dirty="0" smtClean="0">
+              <a:solidFill>
+                <a:schemeClr val="tx1"/>
+              </a:solidFill>
+            </a:endParaRPr>
           </a:p>
           <a:p>
             <a:pPr marL="171450" indent="-171450">
@@ -5056,6 +5204,11 @@
               </a:rPr>
               <a:t>NgayChieu</a:t>
             </a:r>
+            <a:endParaRPr lang="en-US" sz="1200" dirty="0" smtClean="0">
+              <a:solidFill>
+                <a:schemeClr val="tx1"/>
+              </a:solidFill>
+            </a:endParaRPr>
           </a:p>
           <a:p>
             <a:pPr marL="171450" indent="-171450">
@@ -5070,6 +5223,11 @@
               </a:rPr>
               <a:t>GioChieu</a:t>
             </a:r>
+            <a:endParaRPr lang="en-US" sz="1200" dirty="0" smtClean="0">
+              <a:solidFill>
+                <a:schemeClr val="tx1"/>
+              </a:solidFill>
+            </a:endParaRPr>
           </a:p>
           <a:p>
             <a:pPr marL="171450" indent="-171450">
@@ -5084,6 +5242,11 @@
               </a:rPr>
               <a:t>GiaVe</a:t>
             </a:r>
+            <a:endParaRPr lang="en-US" sz="1200" dirty="0" smtClean="0">
+              <a:solidFill>
+                <a:schemeClr val="tx1"/>
+              </a:solidFill>
+            </a:endParaRPr>
           </a:p>
           <a:p>
             <a:pPr marL="171450" indent="-171450">
@@ -5114,8 +5277,8 @@
         </p:nvSpPr>
         <p:spPr>
           <a:xfrm>
-            <a:off x="2209800" y="2693658"/>
-            <a:ext cx="1219200" cy="228600"/>
+            <a:off x="2133600" y="2693670"/>
+            <a:ext cx="1295400" cy="228600"/>
           </a:xfrm>
           <a:prstGeom prst="rect">
             <a:avLst/>
@@ -5221,6 +5384,11 @@
               </a:rPr>
               <a:t>MaVe</a:t>
             </a:r>
+            <a:endParaRPr lang="en-US" sz="1200" dirty="0" smtClean="0">
+              <a:solidFill>
+                <a:schemeClr val="tx1"/>
+              </a:solidFill>
+            </a:endParaRPr>
           </a:p>
           <a:p>
             <a:pPr marL="171450" indent="-171450">
@@ -5235,6 +5403,11 @@
               </a:rPr>
               <a:t>MaLichChieu</a:t>
             </a:r>
+            <a:endParaRPr lang="en-US" sz="1200" dirty="0" smtClean="0">
+              <a:solidFill>
+                <a:schemeClr val="tx1"/>
+              </a:solidFill>
+            </a:endParaRPr>
           </a:p>
           <a:p>
             <a:pPr marL="171450" indent="-171450">
@@ -5249,6 +5422,11 @@
               </a:rPr>
               <a:t>MaGhe</a:t>
             </a:r>
+            <a:endParaRPr lang="en-US" sz="1200" dirty="0" smtClean="0">
+              <a:solidFill>
+                <a:schemeClr val="tx1"/>
+              </a:solidFill>
+            </a:endParaRPr>
           </a:p>
           <a:p>
             <a:pPr marL="171450" indent="-171450">
@@ -5263,6 +5441,11 @@
               </a:rPr>
               <a:t>MaNguoiDung</a:t>
             </a:r>
+            <a:endParaRPr lang="en-US" sz="1200" dirty="0" smtClean="0">
+              <a:solidFill>
+                <a:schemeClr val="tx1"/>
+              </a:solidFill>
+            </a:endParaRPr>
           </a:p>
           <a:p>
             <a:pPr marL="171450" indent="-171450">
@@ -5277,6 +5460,11 @@
               </a:rPr>
               <a:t>TongTien</a:t>
             </a:r>
+            <a:endParaRPr lang="en-US" sz="1200" dirty="0" smtClean="0">
+              <a:solidFill>
+                <a:schemeClr val="tx1"/>
+              </a:solidFill>
+            </a:endParaRPr>
           </a:p>
           <a:p>
             <a:pPr marL="171450" indent="-171450">
@@ -5587,8 +5775,8 @@
         </p:nvCxnSpPr>
         <p:spPr>
           <a:xfrm flipV="1">
-            <a:off x="3429000" y="3206876"/>
-            <a:ext cx="1676400" cy="401182"/>
+            <a:off x="3429000" y="3206738"/>
+            <a:ext cx="1676400" cy="401320"/>
           </a:xfrm>
           <a:prstGeom prst="line">
             <a:avLst/>
@@ -5697,6 +5885,7 @@
               <a:rPr lang="en-US" sz="1000" b="1" dirty="0"/>
               <a:t>n</a:t>
             </a:r>
+            <a:endParaRPr lang="en-US" sz="1000" b="1" dirty="0"/>
           </a:p>
         </p:txBody>
       </p:sp>
@@ -5756,6 +5945,7 @@
               <a:rPr lang="en-US" sz="1000" b="1" dirty="0"/>
               <a:t>n</a:t>
             </a:r>
+            <a:endParaRPr lang="en-US" sz="1000" b="1" dirty="0"/>
           </a:p>
         </p:txBody>
       </p:sp>
@@ -5815,6 +6005,7 @@
               <a:rPr lang="en-US" sz="1000" b="1" dirty="0"/>
               <a:t>n</a:t>
             </a:r>
+            <a:endParaRPr lang="en-US" sz="1000" b="1" dirty="0"/>
           </a:p>
         </p:txBody>
       </p:sp>
@@ -5827,7 +6018,7 @@
         <p:spPr>
           <a:xfrm>
             <a:off x="8118708" y="3341358"/>
-            <a:ext cx="250390" cy="246221"/>
+            <a:ext cx="260350" cy="245110"/>
           </a:xfrm>
           <a:prstGeom prst="rect">
             <a:avLst/>
@@ -5841,10 +6032,10 @@
           <a:lstStyle/>
           <a:p>
             <a:r>
-              <a:rPr lang="en-US" sz="1000" b="1" dirty="0" smtClean="0"/>
-              <a:t>1</a:t>
-            </a:r>
-            <a:endParaRPr lang="en-US" sz="1000" b="1" dirty="0"/>
+              <a:rPr lang="" altLang="en-US" sz="1000" b="1" dirty="0"/>
+              <a:t>n</a:t>
+            </a:r>
+            <a:endParaRPr lang="" altLang="en-US" sz="1000" b="1" dirty="0"/>
           </a:p>
         </p:txBody>
       </p:sp>
@@ -5857,7 +6048,7 @@
         <p:spPr>
           <a:xfrm>
             <a:off x="8157010" y="3868579"/>
-            <a:ext cx="253596" cy="246221"/>
+            <a:ext cx="288925" cy="245110"/>
           </a:xfrm>
           <a:prstGeom prst="rect">
             <a:avLst/>
@@ -5871,9 +6062,10 @@
           <a:lstStyle/>
           <a:p>
             <a:r>
-              <a:rPr lang="en-US" sz="1000" b="1" dirty="0"/>
-              <a:t>n</a:t>
-            </a:r>
+              <a:rPr lang="" altLang="en-US" sz="1000" b="1" dirty="0"/>
+              <a:t>1 </a:t>
+            </a:r>
+            <a:endParaRPr lang="en-US" sz="1000" b="1" dirty="0"/>
           </a:p>
         </p:txBody>
       </p:sp>
@@ -5903,6 +6095,7 @@
               <a:rPr lang="en-US" sz="1000" b="1" dirty="0"/>
               <a:t>n</a:t>
             </a:r>
+            <a:endParaRPr lang="en-US" sz="1000" b="1" dirty="0"/>
           </a:p>
         </p:txBody>
       </p:sp>
@@ -5992,6 +6185,7 @@
               <a:rPr lang="en-US" sz="1000" b="1" dirty="0"/>
               <a:t>n</a:t>
             </a:r>
+            <a:endParaRPr lang="en-US" sz="1000" b="1" dirty="0"/>
           </a:p>
         </p:txBody>
       </p:sp>
@@ -6051,6 +6245,7 @@
               <a:rPr lang="en-US" sz="1000" b="1" dirty="0"/>
               <a:t>n</a:t>
             </a:r>
+            <a:endParaRPr lang="en-US" sz="1000" b="1" dirty="0"/>
           </a:p>
         </p:txBody>
       </p:sp>
@@ -6093,7 +6288,7 @@
         <p:spPr>
           <a:xfrm>
             <a:off x="4851804" y="5697379"/>
-            <a:ext cx="253596" cy="246221"/>
+            <a:ext cx="260350" cy="245110"/>
           </a:xfrm>
           <a:prstGeom prst="rect">
             <a:avLst/>
@@ -6107,10 +6302,10 @@
           <a:lstStyle/>
           <a:p>
             <a:r>
-              <a:rPr lang="en-US" sz="1000" b="1" dirty="0" smtClean="0"/>
-              <a:t>1</a:t>
-            </a:r>
-            <a:endParaRPr lang="en-US" sz="1000" b="1" dirty="0"/>
+              <a:rPr lang="" altLang="en-US" sz="1000" b="1" dirty="0"/>
+              <a:t>n</a:t>
+            </a:r>
+            <a:endParaRPr lang="" altLang="en-US" sz="1000" b="1" dirty="0"/>
           </a:p>
         </p:txBody>
       </p:sp>
@@ -6140,6 +6335,7 @@
               <a:rPr lang="en-US" sz="1000" b="1" dirty="0"/>
               <a:t>n</a:t>
             </a:r>
+            <a:endParaRPr lang="en-US" sz="1000" b="1" dirty="0"/>
           </a:p>
         </p:txBody>
       </p:sp>
@@ -6266,11 +6462,6 @@
         </p:txBody>
       </p:sp>
     </p:spTree>
-    <p:extLst>
-      <p:ext uri="{BB962C8B-B14F-4D97-AF65-F5344CB8AC3E}">
-        <p14:creationId xmlns:p14="http://schemas.microsoft.com/office/powerpoint/2010/main" val="3580009537"/>
-      </p:ext>
-    </p:extLst>
   </p:cSld>
   <p:clrMapOvr>
     <a:masterClrMapping/>
@@ -6558,8 +6749,11 @@
       </a:bgFillStyleLst>
     </a:fmtScheme>
   </a:themeElements>
-  <a:objectDefaults/>
-  <a:extraClrSchemeLst/>
+  <a:extLst>
+    <a:ext uri="{05A4C25C-085E-4340-85A3-A5531E510DB2}">
+      <thm15:themeFamily xmlns:thm15="http://schemas.microsoft.com/office/thememl/2012/main" name="Office Theme" id="{62F939B6-93AF-4DB8-9C6B-D6C7DFDC589F}" vid="{4A3C46E8-61CC-4603-A589-7422A47A8E4A}"/>
+    </a:ext>
+  </a:extLst>
 </a:theme>
 </file>
 
@@ -6843,7 +7037,10 @@
       </a:bgFillStyleLst>
     </a:fmtScheme>
   </a:themeElements>
-  <a:objectDefaults/>
-  <a:extraClrSchemeLst/>
+  <a:extLst>
+    <a:ext uri="{05A4C25C-085E-4340-85A3-A5531E510DB2}">
+      <thm15:themeFamily xmlns:thm15="http://schemas.microsoft.com/office/thememl/2012/main" name="Office Theme" id="{62F939B6-93AF-4DB8-9C6B-D6C7DFDC589F}" vid="{4A3C46E8-61CC-4603-A589-7422A47A8E4A}"/>
+    </a:ext>
+  </a:extLst>
 </a:theme>
 </file>
</xml_diff>

<commit_message>
repository, service, serviceImpl,DTO,db refactor
</commit_message>
<xml_diff>
--- a/db_design/db-booking-ticket.pptx
+++ b/db_design/db-booking-ticket.pptx
@@ -5132,7 +5132,7 @@
               <a:t>MaLichChi</a:t>
             </a:r>
             <a:r>
-              <a:rPr lang="" altLang="en-US" sz="1200" dirty="0" smtClean="0">
+              <a:rPr lang="en-US" altLang="en-US" sz="1200" dirty="0" smtClean="0">
                 <a:solidFill>
                   <a:schemeClr val="tx1"/>
                 </a:solidFill>
@@ -6032,10 +6032,10 @@
           <a:lstStyle/>
           <a:p>
             <a:r>
-              <a:rPr lang="" altLang="en-US" sz="1000" b="1" dirty="0"/>
+              <a:rPr lang="en-US" altLang="en-US" sz="1000" b="1" dirty="0"/>
               <a:t>n</a:t>
             </a:r>
-            <a:endParaRPr lang="" altLang="en-US" sz="1000" b="1" dirty="0"/>
+            <a:endParaRPr lang="en-US" altLang="en-US" sz="1000" b="1" dirty="0"/>
           </a:p>
         </p:txBody>
       </p:sp>
@@ -6062,7 +6062,7 @@
           <a:lstStyle/>
           <a:p>
             <a:r>
-              <a:rPr lang="" altLang="en-US" sz="1000" b="1" dirty="0"/>
+              <a:rPr lang="en-US" altLang="en-US" sz="1000" b="1" dirty="0"/>
               <a:t>1 </a:t>
             </a:r>
             <a:endParaRPr lang="en-US" sz="1000" b="1" dirty="0"/>
@@ -6258,7 +6258,7 @@
         <p:spPr>
           <a:xfrm>
             <a:off x="4038600" y="5697379"/>
-            <a:ext cx="253596" cy="246221"/>
+            <a:ext cx="253365" cy="245110"/>
           </a:xfrm>
           <a:prstGeom prst="rect">
             <a:avLst/>
@@ -6272,10 +6272,10 @@
           <a:lstStyle/>
           <a:p>
             <a:r>
-              <a:rPr lang="en-US" sz="1000" b="1" dirty="0" smtClean="0"/>
-              <a:t>n</a:t>
-            </a:r>
-            <a:endParaRPr lang="en-US" sz="1000" b="1" dirty="0"/>
+              <a:rPr lang="" altLang="en-US" sz="1000" b="1" dirty="0"/>
+              <a:t>1</a:t>
+            </a:r>
+            <a:endParaRPr lang="" altLang="en-US" sz="1000" b="1" dirty="0"/>
           </a:p>
         </p:txBody>
       </p:sp>
@@ -6302,10 +6302,10 @@
           <a:lstStyle/>
           <a:p>
             <a:r>
-              <a:rPr lang="" altLang="en-US" sz="1000" b="1" dirty="0"/>
+              <a:rPr lang="en-US" altLang="en-US" sz="1000" b="1" dirty="0"/>
               <a:t>n</a:t>
             </a:r>
-            <a:endParaRPr lang="" altLang="en-US" sz="1000" b="1" dirty="0"/>
+            <a:endParaRPr lang="en-US" altLang="en-US" sz="1000" b="1" dirty="0"/>
           </a:p>
         </p:txBody>
       </p:sp>

</xml_diff>